<commit_message>
slides for meeting 2/14/2022
</commit_message>
<xml_diff>
--- a/Summary/20220207_microbiome_demographic_slides.pptx
+++ b/Summary/20220207_microbiome_demographic_slides.pptx
@@ -155,7 +155,6 @@
 <file path=ppt/revisionInfo.xml><?xml version="1.0" encoding="utf-8"?>
 <p1510:revInfo xmlns:a="http://schemas.openxmlformats.org/drawingml/2006/main" xmlns:r="http://schemas.openxmlformats.org/officeDocument/2006/relationships" xmlns:p1510="http://schemas.microsoft.com/office/powerpoint/2015/10/main">
   <p1510:revLst>
-    <p1510:client id="{67112047-DF08-46D0-BE46-8A45A8F5BE6D}" v="1" dt="2022-02-07T23:51:53.483"/>
     <p1510:client id="{E5BCE1DD-C913-4C8F-BCAE-E494ABBC0621}" v="32" dt="2022-02-07T22:56:24.398"/>
   </p1510:revLst>
 </p1510:revInfo>
@@ -257,8 +256,8 @@
   </pc:docChgLst>
   <pc:docChgLst>
     <pc:chgData name="Jonathan Mah" userId="5261b2f2f3e51194" providerId="LiveId" clId="{E5BCE1DD-C913-4C8F-BCAE-E494ABBC0621}"/>
-    <pc:docChg chg="custSel addSld delSld modSld modSection">
-      <pc:chgData name="Jonathan Mah" userId="5261b2f2f3e51194" providerId="LiveId" clId="{E5BCE1DD-C913-4C8F-BCAE-E494ABBC0621}" dt="2022-02-07T22:57:21.343" v="997" actId="1076"/>
+    <pc:docChg chg="undo custSel addSld delSld modSld modSection">
+      <pc:chgData name="Jonathan Mah" userId="5261b2f2f3e51194" providerId="LiveId" clId="{E5BCE1DD-C913-4C8F-BCAE-E494ABBC0621}" dt="2022-02-10T16:44:33.542" v="1039" actId="14100"/>
       <pc:docMkLst>
         <pc:docMk/>
       </pc:docMkLst>
@@ -305,8 +304,8 @@
           <pc:sldMk cId="1861435544" sldId="374"/>
         </pc:sldMkLst>
       </pc:sldChg>
-      <pc:sldChg chg="modSp mod">
-        <pc:chgData name="Jonathan Mah" userId="5261b2f2f3e51194" providerId="LiveId" clId="{E5BCE1DD-C913-4C8F-BCAE-E494ABBC0621}" dt="2022-02-07T22:56:32.939" v="986" actId="255"/>
+      <pc:sldChg chg="addSp modSp mod">
+        <pc:chgData name="Jonathan Mah" userId="5261b2f2f3e51194" providerId="LiveId" clId="{E5BCE1DD-C913-4C8F-BCAE-E494ABBC0621}" dt="2022-02-10T16:37:33.312" v="1009" actId="14100"/>
         <pc:sldMkLst>
           <pc:docMk/>
           <pc:sldMk cId="1283892508" sldId="375"/>
@@ -319,6 +318,22 @@
             <ac:graphicFrameMk id="4" creationId="{54714DEA-B2A8-49B0-8CCF-86F2C9980B76}"/>
           </ac:graphicFrameMkLst>
         </pc:graphicFrameChg>
+        <pc:picChg chg="mod">
+          <ac:chgData name="Jonathan Mah" userId="5261b2f2f3e51194" providerId="LiveId" clId="{E5BCE1DD-C913-4C8F-BCAE-E494ABBC0621}" dt="2022-02-10T16:37:31.304" v="1008" actId="14100"/>
+          <ac:picMkLst>
+            <pc:docMk/>
+            <pc:sldMk cId="1283892508" sldId="375"/>
+            <ac:picMk id="3" creationId="{6B94B99C-78EF-46EB-A9F8-A19D69A4CEEC}"/>
+          </ac:picMkLst>
+        </pc:picChg>
+        <pc:picChg chg="add mod">
+          <ac:chgData name="Jonathan Mah" userId="5261b2f2f3e51194" providerId="LiveId" clId="{E5BCE1DD-C913-4C8F-BCAE-E494ABBC0621}" dt="2022-02-10T16:37:33.312" v="1009" actId="14100"/>
+          <ac:picMkLst>
+            <pc:docMk/>
+            <pc:sldMk cId="1283892508" sldId="375"/>
+            <ac:picMk id="5" creationId="{35343367-7995-4BDE-AA87-E8BA6C7347B9}"/>
+          </ac:picMkLst>
+        </pc:picChg>
       </pc:sldChg>
       <pc:sldChg chg="del">
         <pc:chgData name="Jonathan Mah" userId="5261b2f2f3e51194" providerId="LiveId" clId="{E5BCE1DD-C913-4C8F-BCAE-E494ABBC0621}" dt="2022-02-07T22:21:44.391" v="66" actId="47"/>
@@ -327,8 +342,8 @@
           <pc:sldMk cId="1769320149" sldId="376"/>
         </pc:sldMkLst>
       </pc:sldChg>
-      <pc:sldChg chg="modSp mod">
-        <pc:chgData name="Jonathan Mah" userId="5261b2f2f3e51194" providerId="LiveId" clId="{E5BCE1DD-C913-4C8F-BCAE-E494ABBC0621}" dt="2022-02-07T22:56:40.378" v="988" actId="255"/>
+      <pc:sldChg chg="addSp modSp mod">
+        <pc:chgData name="Jonathan Mah" userId="5261b2f2f3e51194" providerId="LiveId" clId="{E5BCE1DD-C913-4C8F-BCAE-E494ABBC0621}" dt="2022-02-10T16:40:24.938" v="1019" actId="14100"/>
         <pc:sldMkLst>
           <pc:docMk/>
           <pc:sldMk cId="347133211" sldId="377"/>
@@ -341,9 +356,25 @@
             <ac:graphicFrameMk id="4" creationId="{54714DEA-B2A8-49B0-8CCF-86F2C9980B76}"/>
           </ac:graphicFrameMkLst>
         </pc:graphicFrameChg>
+        <pc:picChg chg="mod">
+          <ac:chgData name="Jonathan Mah" userId="5261b2f2f3e51194" providerId="LiveId" clId="{E5BCE1DD-C913-4C8F-BCAE-E494ABBC0621}" dt="2022-02-10T16:38:04.001" v="1015" actId="14100"/>
+          <ac:picMkLst>
+            <pc:docMk/>
+            <pc:sldMk cId="347133211" sldId="377"/>
+            <ac:picMk id="3" creationId="{74DAEAC1-9C56-4F96-90CF-106C8BA21CFF}"/>
+          </ac:picMkLst>
+        </pc:picChg>
+        <pc:picChg chg="add mod">
+          <ac:chgData name="Jonathan Mah" userId="5261b2f2f3e51194" providerId="LiveId" clId="{E5BCE1DD-C913-4C8F-BCAE-E494ABBC0621}" dt="2022-02-10T16:40:24.938" v="1019" actId="14100"/>
+          <ac:picMkLst>
+            <pc:docMk/>
+            <pc:sldMk cId="347133211" sldId="377"/>
+            <ac:picMk id="5" creationId="{6C55F24A-12EA-47D1-A1C4-23C917358823}"/>
+          </ac:picMkLst>
+        </pc:picChg>
       </pc:sldChg>
       <pc:sldChg chg="modSp mod">
-        <pc:chgData name="Jonathan Mah" userId="5261b2f2f3e51194" providerId="LiveId" clId="{E5BCE1DD-C913-4C8F-BCAE-E494ABBC0621}" dt="2022-02-07T22:56:47.493" v="990" actId="255"/>
+        <pc:chgData name="Jonathan Mah" userId="5261b2f2f3e51194" providerId="LiveId" clId="{E5BCE1DD-C913-4C8F-BCAE-E494ABBC0621}" dt="2022-02-10T16:40:52.315" v="1021" actId="14100"/>
         <pc:sldMkLst>
           <pc:docMk/>
           <pc:sldMk cId="2109212885" sldId="378"/>
@@ -356,9 +387,17 @@
             <ac:graphicFrameMk id="4" creationId="{54714DEA-B2A8-49B0-8CCF-86F2C9980B76}"/>
           </ac:graphicFrameMkLst>
         </pc:graphicFrameChg>
+        <pc:picChg chg="mod">
+          <ac:chgData name="Jonathan Mah" userId="5261b2f2f3e51194" providerId="LiveId" clId="{E5BCE1DD-C913-4C8F-BCAE-E494ABBC0621}" dt="2022-02-10T16:40:52.315" v="1021" actId="14100"/>
+          <ac:picMkLst>
+            <pc:docMk/>
+            <pc:sldMk cId="2109212885" sldId="378"/>
+            <ac:picMk id="3" creationId="{C1BD4827-3CA5-487D-B3FC-7E8B6B8BF938}"/>
+          </ac:picMkLst>
+        </pc:picChg>
       </pc:sldChg>
-      <pc:sldChg chg="modSp mod">
-        <pc:chgData name="Jonathan Mah" userId="5261b2f2f3e51194" providerId="LiveId" clId="{E5BCE1DD-C913-4C8F-BCAE-E494ABBC0621}" dt="2022-02-07T22:56:54.586" v="992" actId="255"/>
+      <pc:sldChg chg="addSp modSp mod">
+        <pc:chgData name="Jonathan Mah" userId="5261b2f2f3e51194" providerId="LiveId" clId="{E5BCE1DD-C913-4C8F-BCAE-E494ABBC0621}" dt="2022-02-10T16:43:55.030" v="1028" actId="14100"/>
         <pc:sldMkLst>
           <pc:docMk/>
           <pc:sldMk cId="1005389813" sldId="379"/>
@@ -371,9 +410,25 @@
             <ac:graphicFrameMk id="4" creationId="{54714DEA-B2A8-49B0-8CCF-86F2C9980B76}"/>
           </ac:graphicFrameMkLst>
         </pc:graphicFrameChg>
+        <pc:picChg chg="mod">
+          <ac:chgData name="Jonathan Mah" userId="5261b2f2f3e51194" providerId="LiveId" clId="{E5BCE1DD-C913-4C8F-BCAE-E494ABBC0621}" dt="2022-02-10T16:43:38.620" v="1023" actId="14100"/>
+          <ac:picMkLst>
+            <pc:docMk/>
+            <pc:sldMk cId="1005389813" sldId="379"/>
+            <ac:picMk id="3" creationId="{D784D8B1-7572-4F72-BAAC-9D39B9ABB2CF}"/>
+          </ac:picMkLst>
+        </pc:picChg>
+        <pc:picChg chg="add mod">
+          <ac:chgData name="Jonathan Mah" userId="5261b2f2f3e51194" providerId="LiveId" clId="{E5BCE1DD-C913-4C8F-BCAE-E494ABBC0621}" dt="2022-02-10T16:43:55.030" v="1028" actId="14100"/>
+          <ac:picMkLst>
+            <pc:docMk/>
+            <pc:sldMk cId="1005389813" sldId="379"/>
+            <ac:picMk id="5" creationId="{B5C0D388-49E5-4E66-AFA3-F68ED6D65E59}"/>
+          </ac:picMkLst>
+        </pc:picChg>
       </pc:sldChg>
       <pc:sldChg chg="modSp mod">
-        <pc:chgData name="Jonathan Mah" userId="5261b2f2f3e51194" providerId="LiveId" clId="{E5BCE1DD-C913-4C8F-BCAE-E494ABBC0621}" dt="2022-02-07T22:57:02.912" v="994" actId="255"/>
+        <pc:chgData name="Jonathan Mah" userId="5261b2f2f3e51194" providerId="LiveId" clId="{E5BCE1DD-C913-4C8F-BCAE-E494ABBC0621}" dt="2022-02-10T16:44:02.430" v="1030" actId="14100"/>
         <pc:sldMkLst>
           <pc:docMk/>
           <pc:sldMk cId="3119508851" sldId="380"/>
@@ -386,9 +441,17 @@
             <ac:graphicFrameMk id="4" creationId="{54714DEA-B2A8-49B0-8CCF-86F2C9980B76}"/>
           </ac:graphicFrameMkLst>
         </pc:graphicFrameChg>
+        <pc:picChg chg="mod">
+          <ac:chgData name="Jonathan Mah" userId="5261b2f2f3e51194" providerId="LiveId" clId="{E5BCE1DD-C913-4C8F-BCAE-E494ABBC0621}" dt="2022-02-10T16:44:02.430" v="1030" actId="14100"/>
+          <ac:picMkLst>
+            <pc:docMk/>
+            <pc:sldMk cId="3119508851" sldId="380"/>
+            <ac:picMk id="3" creationId="{CC0E4E6B-3D7C-4837-B0CF-7938FF9FB3B4}"/>
+          </ac:picMkLst>
+        </pc:picChg>
       </pc:sldChg>
       <pc:sldChg chg="modSp mod">
-        <pc:chgData name="Jonathan Mah" userId="5261b2f2f3e51194" providerId="LiveId" clId="{E5BCE1DD-C913-4C8F-BCAE-E494ABBC0621}" dt="2022-02-07T22:57:09.946" v="996" actId="255"/>
+        <pc:chgData name="Jonathan Mah" userId="5261b2f2f3e51194" providerId="LiveId" clId="{E5BCE1DD-C913-4C8F-BCAE-E494ABBC0621}" dt="2022-02-10T16:44:13.614" v="1032" actId="14100"/>
         <pc:sldMkLst>
           <pc:docMk/>
           <pc:sldMk cId="1592760820" sldId="381"/>
@@ -401,9 +464,17 @@
             <ac:graphicFrameMk id="4" creationId="{54714DEA-B2A8-49B0-8CCF-86F2C9980B76}"/>
           </ac:graphicFrameMkLst>
         </pc:graphicFrameChg>
+        <pc:picChg chg="mod">
+          <ac:chgData name="Jonathan Mah" userId="5261b2f2f3e51194" providerId="LiveId" clId="{E5BCE1DD-C913-4C8F-BCAE-E494ABBC0621}" dt="2022-02-10T16:44:13.614" v="1032" actId="14100"/>
+          <ac:picMkLst>
+            <pc:docMk/>
+            <pc:sldMk cId="1592760820" sldId="381"/>
+            <ac:picMk id="3" creationId="{72FEBE7C-5B9B-4AF7-A9E3-5BDCF6D4A04D}"/>
+          </ac:picMkLst>
+        </pc:picChg>
       </pc:sldChg>
       <pc:sldChg chg="modSp mod">
-        <pc:chgData name="Jonathan Mah" userId="5261b2f2f3e51194" providerId="LiveId" clId="{E5BCE1DD-C913-4C8F-BCAE-E494ABBC0621}" dt="2022-02-07T22:50:06.113" v="953" actId="255"/>
+        <pc:chgData name="Jonathan Mah" userId="5261b2f2f3e51194" providerId="LiveId" clId="{E5BCE1DD-C913-4C8F-BCAE-E494ABBC0621}" dt="2022-02-10T16:44:20.141" v="1034" actId="14100"/>
         <pc:sldMkLst>
           <pc:docMk/>
           <pc:sldMk cId="1697860273" sldId="382"/>
@@ -416,9 +487,17 @@
             <ac:graphicFrameMk id="4" creationId="{54714DEA-B2A8-49B0-8CCF-86F2C9980B76}"/>
           </ac:graphicFrameMkLst>
         </pc:graphicFrameChg>
+        <pc:picChg chg="mod">
+          <ac:chgData name="Jonathan Mah" userId="5261b2f2f3e51194" providerId="LiveId" clId="{E5BCE1DD-C913-4C8F-BCAE-E494ABBC0621}" dt="2022-02-10T16:44:20.141" v="1034" actId="14100"/>
+          <ac:picMkLst>
+            <pc:docMk/>
+            <pc:sldMk cId="1697860273" sldId="382"/>
+            <ac:picMk id="3" creationId="{D7375737-FA01-400E-A912-0A37730A5E28}"/>
+          </ac:picMkLst>
+        </pc:picChg>
       </pc:sldChg>
       <pc:sldChg chg="modSp mod">
-        <pc:chgData name="Jonathan Mah" userId="5261b2f2f3e51194" providerId="LiveId" clId="{E5BCE1DD-C913-4C8F-BCAE-E494ABBC0621}" dt="2022-02-07T22:50:18.476" v="955" actId="255"/>
+        <pc:chgData name="Jonathan Mah" userId="5261b2f2f3e51194" providerId="LiveId" clId="{E5BCE1DD-C913-4C8F-BCAE-E494ABBC0621}" dt="2022-02-10T16:44:25.598" v="1036" actId="14100"/>
         <pc:sldMkLst>
           <pc:docMk/>
           <pc:sldMk cId="1664470511" sldId="383"/>
@@ -432,7 +511,7 @@
           </ac:graphicFrameMkLst>
         </pc:graphicFrameChg>
         <pc:picChg chg="mod">
-          <ac:chgData name="Jonathan Mah" userId="5261b2f2f3e51194" providerId="LiveId" clId="{E5BCE1DD-C913-4C8F-BCAE-E494ABBC0621}" dt="2022-02-07T22:47:37.431" v="936" actId="1076"/>
+          <ac:chgData name="Jonathan Mah" userId="5261b2f2f3e51194" providerId="LiveId" clId="{E5BCE1DD-C913-4C8F-BCAE-E494ABBC0621}" dt="2022-02-10T16:44:25.598" v="1036" actId="14100"/>
           <ac:picMkLst>
             <pc:docMk/>
             <pc:sldMk cId="1664470511" sldId="383"/>
@@ -441,7 +520,7 @@
         </pc:picChg>
       </pc:sldChg>
       <pc:sldChg chg="modSp mod">
-        <pc:chgData name="Jonathan Mah" userId="5261b2f2f3e51194" providerId="LiveId" clId="{E5BCE1DD-C913-4C8F-BCAE-E494ABBC0621}" dt="2022-02-07T22:57:21.343" v="997" actId="1076"/>
+        <pc:chgData name="Jonathan Mah" userId="5261b2f2f3e51194" providerId="LiveId" clId="{E5BCE1DD-C913-4C8F-BCAE-E494ABBC0621}" dt="2022-02-10T16:44:33.542" v="1039" actId="14100"/>
         <pc:sldMkLst>
           <pc:docMk/>
           <pc:sldMk cId="925521410" sldId="384"/>
@@ -454,6 +533,14 @@
             <ac:graphicFrameMk id="4" creationId="{54714DEA-B2A8-49B0-8CCF-86F2C9980B76}"/>
           </ac:graphicFrameMkLst>
         </pc:graphicFrameChg>
+        <pc:picChg chg="mod">
+          <ac:chgData name="Jonathan Mah" userId="5261b2f2f3e51194" providerId="LiveId" clId="{E5BCE1DD-C913-4C8F-BCAE-E494ABBC0621}" dt="2022-02-10T16:44:33.542" v="1039" actId="14100"/>
+          <ac:picMkLst>
+            <pc:docMk/>
+            <pc:sldMk cId="925521410" sldId="384"/>
+            <ac:picMk id="3" creationId="{CB4929A7-EF69-4116-9B8A-B64097CC0A8E}"/>
+          </ac:picMkLst>
+        </pc:picChg>
       </pc:sldChg>
       <pc:sldChg chg="addSp modSp new mod">
         <pc:chgData name="Jonathan Mah" userId="5261b2f2f3e51194" providerId="LiveId" clId="{E5BCE1DD-C913-4C8F-BCAE-E494ABBC0621}" dt="2022-02-07T22:25:01.783" v="354" actId="9405"/>
@@ -704,7 +791,7 @@
           <a:p>
             <a:fld id="{2F446724-7A58-4020-9182-8374F0305DD3}" type="datetimeFigureOut">
               <a:rPr lang="en-US" smtClean="0"/>
-              <a:t>2/7/2022</a:t>
+              <a:t>2/10/2022</a:t>
             </a:fld>
             <a:endParaRPr lang="en-US"/>
           </a:p>
@@ -1118,7 +1205,7 @@
           <a:p>
             <a:fld id="{6A6E4237-9E27-40CF-A4D8-1330F92F21DA}" type="datetimeFigureOut">
               <a:rPr lang="en-US" smtClean="0"/>
-              <a:t>2/7/2022</a:t>
+              <a:t>2/10/2022</a:t>
             </a:fld>
             <a:endParaRPr lang="en-US"/>
           </a:p>
@@ -1316,7 +1403,7 @@
           <a:p>
             <a:fld id="{6A6E4237-9E27-40CF-A4D8-1330F92F21DA}" type="datetimeFigureOut">
               <a:rPr lang="en-US" smtClean="0"/>
-              <a:t>2/7/2022</a:t>
+              <a:t>2/10/2022</a:t>
             </a:fld>
             <a:endParaRPr lang="en-US"/>
           </a:p>
@@ -1524,7 +1611,7 @@
           <a:p>
             <a:fld id="{6A6E4237-9E27-40CF-A4D8-1330F92F21DA}" type="datetimeFigureOut">
               <a:rPr lang="en-US" smtClean="0"/>
-              <a:t>2/7/2022</a:t>
+              <a:t>2/10/2022</a:t>
             </a:fld>
             <a:endParaRPr lang="en-US"/>
           </a:p>
@@ -1722,7 +1809,7 @@
           <a:p>
             <a:fld id="{6A6E4237-9E27-40CF-A4D8-1330F92F21DA}" type="datetimeFigureOut">
               <a:rPr lang="en-US" smtClean="0"/>
-              <a:t>2/7/2022</a:t>
+              <a:t>2/10/2022</a:t>
             </a:fld>
             <a:endParaRPr lang="en-US"/>
           </a:p>
@@ -1997,7 +2084,7 @@
           <a:p>
             <a:fld id="{6A6E4237-9E27-40CF-A4D8-1330F92F21DA}" type="datetimeFigureOut">
               <a:rPr lang="en-US" smtClean="0"/>
-              <a:t>2/7/2022</a:t>
+              <a:t>2/10/2022</a:t>
             </a:fld>
             <a:endParaRPr lang="en-US"/>
           </a:p>
@@ -2262,7 +2349,7 @@
           <a:p>
             <a:fld id="{6A6E4237-9E27-40CF-A4D8-1330F92F21DA}" type="datetimeFigureOut">
               <a:rPr lang="en-US" smtClean="0"/>
-              <a:t>2/7/2022</a:t>
+              <a:t>2/10/2022</a:t>
             </a:fld>
             <a:endParaRPr lang="en-US"/>
           </a:p>
@@ -2674,7 +2761,7 @@
           <a:p>
             <a:fld id="{6A6E4237-9E27-40CF-A4D8-1330F92F21DA}" type="datetimeFigureOut">
               <a:rPr lang="en-US" smtClean="0"/>
-              <a:t>2/7/2022</a:t>
+              <a:t>2/10/2022</a:t>
             </a:fld>
             <a:endParaRPr lang="en-US"/>
           </a:p>
@@ -2815,7 +2902,7 @@
           <a:p>
             <a:fld id="{6A6E4237-9E27-40CF-A4D8-1330F92F21DA}" type="datetimeFigureOut">
               <a:rPr lang="en-US" smtClean="0"/>
-              <a:t>2/7/2022</a:t>
+              <a:t>2/10/2022</a:t>
             </a:fld>
             <a:endParaRPr lang="en-US"/>
           </a:p>
@@ -2928,7 +3015,7 @@
           <a:p>
             <a:fld id="{6A6E4237-9E27-40CF-A4D8-1330F92F21DA}" type="datetimeFigureOut">
               <a:rPr lang="en-US" smtClean="0"/>
-              <a:t>2/7/2022</a:t>
+              <a:t>2/10/2022</a:t>
             </a:fld>
             <a:endParaRPr lang="en-US"/>
           </a:p>
@@ -3239,7 +3326,7 @@
           <a:p>
             <a:fld id="{6A6E4237-9E27-40CF-A4D8-1330F92F21DA}" type="datetimeFigureOut">
               <a:rPr lang="en-US" smtClean="0"/>
-              <a:t>2/7/2022</a:t>
+              <a:t>2/10/2022</a:t>
             </a:fld>
             <a:endParaRPr lang="en-US"/>
           </a:p>
@@ -3527,7 +3614,7 @@
           <a:p>
             <a:fld id="{6A6E4237-9E27-40CF-A4D8-1330F92F21DA}" type="datetimeFigureOut">
               <a:rPr lang="en-US" smtClean="0"/>
-              <a:t>2/7/2022</a:t>
+              <a:t>2/10/2022</a:t>
             </a:fld>
             <a:endParaRPr lang="en-US"/>
           </a:p>
@@ -3768,7 +3855,7 @@
           <a:p>
             <a:fld id="{6A6E4237-9E27-40CF-A4D8-1330F92F21DA}" type="datetimeFigureOut">
               <a:rPr lang="en-US" smtClean="0"/>
-              <a:t>2/7/2022</a:t>
+              <a:t>2/10/2022</a:t>
             </a:fld>
             <a:endParaRPr lang="en-US"/>
           </a:p>
@@ -4696,8 +4783,8 @@
         </p:blipFill>
         <p:spPr>
           <a:xfrm>
-            <a:off x="1419725" y="2145147"/>
-            <a:ext cx="9890961" cy="4712853"/>
+            <a:off x="12795" y="2145147"/>
+            <a:ext cx="6083206" cy="4712853"/>
           </a:xfrm>
           <a:prstGeom prst="rect">
             <a:avLst/>
@@ -5106,8 +5193,8 @@
         </p:blipFill>
         <p:spPr>
           <a:xfrm>
-            <a:off x="1720516" y="2325957"/>
-            <a:ext cx="9460330" cy="4532043"/>
+            <a:off x="0" y="2325957"/>
+            <a:ext cx="6096000" cy="4532043"/>
           </a:xfrm>
           <a:prstGeom prst="rect">
             <a:avLst/>
@@ -6445,8 +6532,38 @@
         </p:blipFill>
         <p:spPr>
           <a:xfrm>
-            <a:off x="2469813" y="2467055"/>
-            <a:ext cx="9017001" cy="4334488"/>
+            <a:off x="1" y="2523512"/>
+            <a:ext cx="6095999" cy="4343400"/>
+          </a:xfrm>
+          <a:prstGeom prst="rect">
+            <a:avLst/>
+          </a:prstGeom>
+        </p:spPr>
+      </p:pic>
+      <p:pic>
+        <p:nvPicPr>
+          <p:cNvPr id="5" name="Picture 4">
+            <a:extLst>
+              <a:ext uri="{FF2B5EF4-FFF2-40B4-BE49-F238E27FC236}">
+                <a16:creationId xmlns:a16="http://schemas.microsoft.com/office/drawing/2014/main" id="{35343367-7995-4BDE-AA87-E8BA6C7347B9}"/>
+              </a:ext>
+            </a:extLst>
+          </p:cNvPr>
+          <p:cNvPicPr>
+            <a:picLocks noChangeAspect="1"/>
+          </p:cNvPicPr>
+          <p:nvPr/>
+        </p:nvPicPr>
+        <p:blipFill>
+          <a:blip r:embed="rId3"/>
+          <a:stretch>
+            <a:fillRect/>
+          </a:stretch>
+        </p:blipFill>
+        <p:spPr>
+          <a:xfrm>
+            <a:off x="6220327" y="2523512"/>
+            <a:ext cx="5971674" cy="4343400"/>
           </a:xfrm>
           <a:prstGeom prst="rect">
             <a:avLst/>
@@ -6851,8 +6968,38 @@
         </p:blipFill>
         <p:spPr>
           <a:xfrm>
-            <a:off x="1552073" y="2351536"/>
-            <a:ext cx="9357059" cy="4506464"/>
+            <a:off x="1" y="2351536"/>
+            <a:ext cx="6096000" cy="4506464"/>
+          </a:xfrm>
+          <a:prstGeom prst="rect">
+            <a:avLst/>
+          </a:prstGeom>
+        </p:spPr>
+      </p:pic>
+      <p:pic>
+        <p:nvPicPr>
+          <p:cNvPr id="5" name="Picture 4">
+            <a:extLst>
+              <a:ext uri="{FF2B5EF4-FFF2-40B4-BE49-F238E27FC236}">
+                <a16:creationId xmlns:a16="http://schemas.microsoft.com/office/drawing/2014/main" id="{6C55F24A-12EA-47D1-A1C4-23C917358823}"/>
+              </a:ext>
+            </a:extLst>
+          </p:cNvPr>
+          <p:cNvPicPr>
+            <a:picLocks noChangeAspect="1"/>
+          </p:cNvPicPr>
+          <p:nvPr/>
+        </p:nvPicPr>
+        <p:blipFill>
+          <a:blip r:embed="rId3"/>
+          <a:stretch>
+            <a:fillRect/>
+          </a:stretch>
+        </p:blipFill>
+        <p:spPr>
+          <a:xfrm>
+            <a:off x="6095999" y="2351534"/>
+            <a:ext cx="6096000" cy="4506465"/>
           </a:xfrm>
           <a:prstGeom prst="rect">
             <a:avLst/>
@@ -7257,8 +7404,8 @@
         </p:blipFill>
         <p:spPr>
           <a:xfrm>
-            <a:off x="1540042" y="2330008"/>
-            <a:ext cx="9463087" cy="4527992"/>
+            <a:off x="1" y="2330008"/>
+            <a:ext cx="6096000" cy="4527992"/>
           </a:xfrm>
           <a:prstGeom prst="rect">
             <a:avLst/>
@@ -7661,8 +7808,38 @@
         </p:blipFill>
         <p:spPr>
           <a:xfrm>
-            <a:off x="1186489" y="2150368"/>
-            <a:ext cx="9819021" cy="4707632"/>
+            <a:off x="1" y="2150368"/>
+            <a:ext cx="6096000" cy="4707632"/>
+          </a:xfrm>
+          <a:prstGeom prst="rect">
+            <a:avLst/>
+          </a:prstGeom>
+        </p:spPr>
+      </p:pic>
+      <p:pic>
+        <p:nvPicPr>
+          <p:cNvPr id="5" name="Picture 4">
+            <a:extLst>
+              <a:ext uri="{FF2B5EF4-FFF2-40B4-BE49-F238E27FC236}">
+                <a16:creationId xmlns:a16="http://schemas.microsoft.com/office/drawing/2014/main" id="{B5C0D388-49E5-4E66-AFA3-F68ED6D65E59}"/>
+              </a:ext>
+            </a:extLst>
+          </p:cNvPr>
+          <p:cNvPicPr>
+            <a:picLocks noChangeAspect="1"/>
+          </p:cNvPicPr>
+          <p:nvPr/>
+        </p:nvPicPr>
+        <p:blipFill>
+          <a:blip r:embed="rId3"/>
+          <a:stretch>
+            <a:fillRect/>
+          </a:stretch>
+        </p:blipFill>
+        <p:spPr>
+          <a:xfrm>
+            <a:off x="6096000" y="2150368"/>
+            <a:ext cx="6096000" cy="4707632"/>
           </a:xfrm>
           <a:prstGeom prst="rect">
             <a:avLst/>
@@ -8067,8 +8244,8 @@
         </p:blipFill>
         <p:spPr>
           <a:xfrm>
-            <a:off x="1931694" y="2237171"/>
-            <a:ext cx="9652585" cy="4620829"/>
+            <a:off x="1" y="2237171"/>
+            <a:ext cx="6096000" cy="4620829"/>
           </a:xfrm>
           <a:prstGeom prst="rect">
             <a:avLst/>
@@ -8473,8 +8650,8 @@
         </p:blipFill>
         <p:spPr>
           <a:xfrm>
-            <a:off x="1720516" y="2176140"/>
-            <a:ext cx="9819021" cy="4681860"/>
+            <a:off x="1" y="2176140"/>
+            <a:ext cx="6096000" cy="4681860"/>
           </a:xfrm>
           <a:prstGeom prst="rect">
             <a:avLst/>
@@ -8879,8 +9056,8 @@
         </p:blipFill>
         <p:spPr>
           <a:xfrm>
-            <a:off x="1378994" y="2318450"/>
-            <a:ext cx="9434011" cy="4539550"/>
+            <a:off x="1" y="2318450"/>
+            <a:ext cx="6096000" cy="4539550"/>
           </a:xfrm>
           <a:prstGeom prst="rect">
             <a:avLst/>

</xml_diff>